<commit_message>
Update Seminarplan and slides for weeks 2 and 4
</commit_message>
<xml_diff>
--- a/2_Slides/5_Hausarbeit schreiben + registrations.pptx
+++ b/2_Slides/5_Hausarbeit schreiben + registrations.pptx
@@ -193,12 +193,33 @@
 </p:cmAuthorLst>
 </file>
 
-<file path=ppt/revisionInfo.xml><?xml version="1.0" encoding="utf-8"?>
-<p1510:revInfo xmlns:a="http://schemas.openxmlformats.org/drawingml/2006/main" xmlns:r="http://schemas.openxmlformats.org/officeDocument/2006/relationships" xmlns:p1510="http://schemas.microsoft.com/office/powerpoint/2015/10/main">
-  <p1510:revLst>
-    <p1510:client id="{BB2FAA6E-5446-4FB9-A037-FD31DAD71D8E}" v="78" dt="2022-11-08T10:26:16.076"/>
-  </p1510:revLst>
-</p1510:revInfo>
+<file path=ppt/changesInfos/changesInfo1.xml><?xml version="1.0" encoding="utf-8"?>
+<pc:chgInfo xmlns:a="http://schemas.openxmlformats.org/drawingml/2006/main" xmlns:r="http://schemas.openxmlformats.org/officeDocument/2006/relationships" xmlns:ac="http://schemas.microsoft.com/office/drawing/2013/main/command" xmlns:pc="http://schemas.microsoft.com/office/powerpoint/2013/main/command">
+  <pc:docChgLst>
+    <pc:chgData name="C C" userId="58c016da926720ee" providerId="LiveId" clId="{B2A0AF1A-FA4B-4C79-86D6-C49DCD68E2ED}"/>
+    <pc:docChg chg="modSld">
+      <pc:chgData name="C C" userId="58c016da926720ee" providerId="LiveId" clId="{B2A0AF1A-FA4B-4C79-86D6-C49DCD68E2ED}" dt="2023-05-09T09:03:06.164" v="26" actId="20577"/>
+      <pc:docMkLst>
+        <pc:docMk/>
+      </pc:docMkLst>
+      <pc:sldChg chg="modSp mod">
+        <pc:chgData name="C C" userId="58c016da926720ee" providerId="LiveId" clId="{B2A0AF1A-FA4B-4C79-86D6-C49DCD68E2ED}" dt="2023-05-09T09:03:06.164" v="26" actId="20577"/>
+        <pc:sldMkLst>
+          <pc:docMk/>
+          <pc:sldMk cId="3533300035" sldId="257"/>
+        </pc:sldMkLst>
+        <pc:spChg chg="mod">
+          <ac:chgData name="C C" userId="58c016da926720ee" providerId="LiveId" clId="{B2A0AF1A-FA4B-4C79-86D6-C49DCD68E2ED}" dt="2023-05-09T09:03:06.164" v="26" actId="20577"/>
+          <ac:spMkLst>
+            <pc:docMk/>
+            <pc:sldMk cId="3533300035" sldId="257"/>
+            <ac:spMk id="5" creationId="{5B5A2214-0261-4489-8A63-55817E9128D8}"/>
+          </ac:spMkLst>
+        </pc:spChg>
+      </pc:sldChg>
+    </pc:docChg>
+  </pc:docChgLst>
+</pc:chgInfo>
 </file>
 
 <file path=ppt/handoutMasters/handoutMaster1.xml><?xml version="1.0" encoding="utf-8"?>
@@ -6124,6 +6145,13 @@
             </a:r>
           </a:p>
           <a:p>
+            <a:pPr marL="812800" lvl="1" indent="-457200"/>
+            <a:r>
+              <a:rPr lang="de-DE" dirty="0"/>
+              <a:t>Gemeinsame Übung: Daten finden und lesen</a:t>
+            </a:r>
+          </a:p>
+          <a:p>
             <a:pPr marL="457200" indent="-457200">
               <a:buFont typeface="Arial" panose="020B0604020202020204" pitchFamily="34" charset="0"/>
               <a:buChar char="•"/>
@@ -6138,13 +6166,6 @@
             <a:r>
               <a:rPr lang="de-DE" noProof="0" dirty="0"/>
               <a:t>Researcher Degrees of Freedom &amp; Anreizstruktur als Problem der Wissenschaft</a:t>
-            </a:r>
-          </a:p>
-          <a:p>
-            <a:pPr marL="812800" lvl="1" indent="-457200"/>
-            <a:r>
-              <a:rPr lang="de-DE" dirty="0"/>
-              <a:t>Gemeinsame Übung: Registered Report lesen </a:t>
             </a:r>
           </a:p>
           <a:p>

</xml_diff>